<commit_message>
updated sql files with summaries and descriptions; updated summary stats by regions and subregions queries to create unnested tables and removed redundant variables; updated functions for graphs comparing citations between regions and subregions; updated figure 3 functions to cater for the above changes.
</commit_message>
<xml_diff>
--- a/report_graphs/figure3/fig3.pptx
+++ b/report_graphs/figure3/fig3.pptx
@@ -104,6 +104,11 @@
       </a:defRPr>
     </a:lvl9pPr>
   </p:defaultTextStyle>
+  <p:extLst>
+    <p:ext uri="{EFAFB233-063F-42B5-8137-9DF3F51BA10A}">
+      <p15:sldGuideLst xmlns:p15="http://schemas.microsoft.com/office/powerpoint/2012/main"/>
+    </p:ext>
+  </p:extLst>
 </p:presentation>
 </file>
 
@@ -238,7 +243,7 @@
           <a:p>
             <a:fld id="{7947412D-8616-40B0-8F67-C9E13C424D56}" type="datetimeFigureOut">
               <a:rPr lang="en-AU" smtClean="0"/>
-              <a:t>1/08/2022</a:t>
+              <a:t>17/08/2022</a:t>
             </a:fld>
             <a:endParaRPr lang="en-AU"/>
           </a:p>
@@ -408,7 +413,7 @@
           <a:p>
             <a:fld id="{7947412D-8616-40B0-8F67-C9E13C424D56}" type="datetimeFigureOut">
               <a:rPr lang="en-AU" smtClean="0"/>
-              <a:t>1/08/2022</a:t>
+              <a:t>17/08/2022</a:t>
             </a:fld>
             <a:endParaRPr lang="en-AU"/>
           </a:p>
@@ -588,7 +593,7 @@
           <a:p>
             <a:fld id="{7947412D-8616-40B0-8F67-C9E13C424D56}" type="datetimeFigureOut">
               <a:rPr lang="en-AU" smtClean="0"/>
-              <a:t>1/08/2022</a:t>
+              <a:t>17/08/2022</a:t>
             </a:fld>
             <a:endParaRPr lang="en-AU"/>
           </a:p>
@@ -758,7 +763,7 @@
           <a:p>
             <a:fld id="{7947412D-8616-40B0-8F67-C9E13C424D56}" type="datetimeFigureOut">
               <a:rPr lang="en-AU" smtClean="0"/>
-              <a:t>1/08/2022</a:t>
+              <a:t>17/08/2022</a:t>
             </a:fld>
             <a:endParaRPr lang="en-AU"/>
           </a:p>
@@ -1002,7 +1007,7 @@
           <a:p>
             <a:fld id="{7947412D-8616-40B0-8F67-C9E13C424D56}" type="datetimeFigureOut">
               <a:rPr lang="en-AU" smtClean="0"/>
-              <a:t>1/08/2022</a:t>
+              <a:t>17/08/2022</a:t>
             </a:fld>
             <a:endParaRPr lang="en-AU"/>
           </a:p>
@@ -1234,7 +1239,7 @@
           <a:p>
             <a:fld id="{7947412D-8616-40B0-8F67-C9E13C424D56}" type="datetimeFigureOut">
               <a:rPr lang="en-AU" smtClean="0"/>
-              <a:t>1/08/2022</a:t>
+              <a:t>17/08/2022</a:t>
             </a:fld>
             <a:endParaRPr lang="en-AU"/>
           </a:p>
@@ -1601,7 +1606,7 @@
           <a:p>
             <a:fld id="{7947412D-8616-40B0-8F67-C9E13C424D56}" type="datetimeFigureOut">
               <a:rPr lang="en-AU" smtClean="0"/>
-              <a:t>1/08/2022</a:t>
+              <a:t>17/08/2022</a:t>
             </a:fld>
             <a:endParaRPr lang="en-AU"/>
           </a:p>
@@ -1719,7 +1724,7 @@
           <a:p>
             <a:fld id="{7947412D-8616-40B0-8F67-C9E13C424D56}" type="datetimeFigureOut">
               <a:rPr lang="en-AU" smtClean="0"/>
-              <a:t>1/08/2022</a:t>
+              <a:t>17/08/2022</a:t>
             </a:fld>
             <a:endParaRPr lang="en-AU"/>
           </a:p>
@@ -1814,7 +1819,7 @@
           <a:p>
             <a:fld id="{7947412D-8616-40B0-8F67-C9E13C424D56}" type="datetimeFigureOut">
               <a:rPr lang="en-AU" smtClean="0"/>
-              <a:t>1/08/2022</a:t>
+              <a:t>17/08/2022</a:t>
             </a:fld>
             <a:endParaRPr lang="en-AU"/>
           </a:p>
@@ -2091,7 +2096,7 @@
           <a:p>
             <a:fld id="{7947412D-8616-40B0-8F67-C9E13C424D56}" type="datetimeFigureOut">
               <a:rPr lang="en-AU" smtClean="0"/>
-              <a:t>1/08/2022</a:t>
+              <a:t>17/08/2022</a:t>
             </a:fld>
             <a:endParaRPr lang="en-AU"/>
           </a:p>
@@ -2348,7 +2353,7 @@
           <a:p>
             <a:fld id="{7947412D-8616-40B0-8F67-C9E13C424D56}" type="datetimeFigureOut">
               <a:rPr lang="en-AU" smtClean="0"/>
-              <a:t>1/08/2022</a:t>
+              <a:t>17/08/2022</a:t>
             </a:fld>
             <a:endParaRPr lang="en-AU"/>
           </a:p>
@@ -2561,7 +2566,7 @@
           <a:p>
             <a:fld id="{7947412D-8616-40B0-8F67-C9E13C424D56}" type="datetimeFigureOut">
               <a:rPr lang="en-AU" smtClean="0"/>
-              <a:t>1/08/2022</a:t>
+              <a:t>17/08/2022</a:t>
             </a:fld>
             <a:endParaRPr lang="en-AU"/>
           </a:p>
@@ -2968,10 +2973,10 @@
       </p:grpSpPr>
       <p:pic>
         <p:nvPicPr>
-          <p:cNvPr id="9" name="Picture 8" descr="Chart&#10;&#10;Description automatically generated">
+          <p:cNvPr id="3" name="Picture 2" descr="Chart&#10;&#10;Description automatically generated">
             <a:extLst>
               <a:ext uri="{FF2B5EF4-FFF2-40B4-BE49-F238E27FC236}">
-                <a16:creationId xmlns:a16="http://schemas.microsoft.com/office/drawing/2014/main" id="{64DB07D2-E982-54EB-C0FF-D32911E4E454}"/>
+                <a16:creationId xmlns:a16="http://schemas.microsoft.com/office/drawing/2014/main" id="{5492DD04-095A-8B79-E6FD-297700C85D8E}"/>
               </a:ext>
             </a:extLst>
           </p:cNvPr>
@@ -2994,8 +2999,8 @@
         </p:blipFill>
         <p:spPr>
           <a:xfrm>
-            <a:off x="109062" y="35166"/>
-            <a:ext cx="13188462" cy="24951145"/>
+            <a:off x="341667" y="-3"/>
+            <a:ext cx="13193486" cy="24960649"/>
           </a:xfrm>
           <a:prstGeom prst="rect">
             <a:avLst/>
@@ -3004,10 +3009,10 @@
       </p:pic>
       <p:pic>
         <p:nvPicPr>
-          <p:cNvPr id="11" name="Picture 10" descr="Chart, line chart&#10;&#10;Description automatically generated">
+          <p:cNvPr id="5" name="Picture 4" descr="Chart, line chart&#10;&#10;Description automatically generated">
             <a:extLst>
               <a:ext uri="{FF2B5EF4-FFF2-40B4-BE49-F238E27FC236}">
-                <a16:creationId xmlns:a16="http://schemas.microsoft.com/office/drawing/2014/main" id="{2154BD1B-BFD3-5FA5-2D5E-DACD46982CAF}"/>
+                <a16:creationId xmlns:a16="http://schemas.microsoft.com/office/drawing/2014/main" id="{F28C455D-0CBC-3619-C2BA-BBF99DE2A0A0}"/>
               </a:ext>
             </a:extLst>
           </p:cNvPr>
@@ -3030,8 +3035,8 @@
         </p:blipFill>
         <p:spPr>
           <a:xfrm>
-            <a:off x="13649214" y="-2"/>
-            <a:ext cx="22456031" cy="24951145"/>
+            <a:off x="13535153" y="-3"/>
+            <a:ext cx="22464586" cy="24960651"/>
           </a:xfrm>
           <a:prstGeom prst="rect">
             <a:avLst/>

</xml_diff>